<commit_message>
Revisions to sbl talk.
</commit_message>
<xml_diff>
--- a/SBL_talk/sbl_presentation_cut.pptx
+++ b/SBL_talk/sbl_presentation_cut.pptx
@@ -2,45 +2,46 @@
 <file path=ppt/presentation.xml><?xml version="1.0" encoding="utf-8"?>
 <p:presentation xmlns:a="http://schemas.openxmlformats.org/drawingml/2006/main" xmlns:r="http://schemas.openxmlformats.org/officeDocument/2006/relationships" xmlns:p="http://schemas.openxmlformats.org/presentationml/2006/main" saveSubsetFonts="1">
   <p:sldMasterIdLst>
-    <p:sldMasterId id="2147483648" r:id="rId1"/>
+    <p:sldMasterId id="2147483672" r:id="rId1"/>
   </p:sldMasterIdLst>
   <p:notesMasterIdLst>
-    <p:notesMasterId r:id="rId35"/>
+    <p:notesMasterId r:id="rId36"/>
   </p:notesMasterIdLst>
   <p:sldIdLst>
     <p:sldId id="327" r:id="rId2"/>
     <p:sldId id="277" r:id="rId3"/>
     <p:sldId id="329" r:id="rId4"/>
-    <p:sldId id="284" r:id="rId5"/>
-    <p:sldId id="278" r:id="rId6"/>
-    <p:sldId id="282" r:id="rId7"/>
-    <p:sldId id="279" r:id="rId8"/>
-    <p:sldId id="280" r:id="rId9"/>
-    <p:sldId id="328" r:id="rId10"/>
-    <p:sldId id="286" r:id="rId11"/>
-    <p:sldId id="291" r:id="rId12"/>
-    <p:sldId id="260" r:id="rId13"/>
-    <p:sldId id="261" r:id="rId14"/>
-    <p:sldId id="267" r:id="rId15"/>
-    <p:sldId id="263" r:id="rId16"/>
-    <p:sldId id="265" r:id="rId17"/>
-    <p:sldId id="266" r:id="rId18"/>
-    <p:sldId id="268" r:id="rId19"/>
-    <p:sldId id="275" r:id="rId20"/>
-    <p:sldId id="298" r:id="rId21"/>
-    <p:sldId id="318" r:id="rId22"/>
-    <p:sldId id="292" r:id="rId23"/>
-    <p:sldId id="293" r:id="rId24"/>
-    <p:sldId id="294" r:id="rId25"/>
-    <p:sldId id="308" r:id="rId26"/>
-    <p:sldId id="303" r:id="rId27"/>
-    <p:sldId id="304" r:id="rId28"/>
-    <p:sldId id="309" r:id="rId29"/>
-    <p:sldId id="310" r:id="rId30"/>
-    <p:sldId id="311" r:id="rId31"/>
-    <p:sldId id="325" r:id="rId32"/>
-    <p:sldId id="330" r:id="rId33"/>
-    <p:sldId id="326" r:id="rId34"/>
+    <p:sldId id="332" r:id="rId5"/>
+    <p:sldId id="284" r:id="rId6"/>
+    <p:sldId id="331" r:id="rId7"/>
+    <p:sldId id="282" r:id="rId8"/>
+    <p:sldId id="279" r:id="rId9"/>
+    <p:sldId id="280" r:id="rId10"/>
+    <p:sldId id="328" r:id="rId11"/>
+    <p:sldId id="286" r:id="rId12"/>
+    <p:sldId id="291" r:id="rId13"/>
+    <p:sldId id="260" r:id="rId14"/>
+    <p:sldId id="261" r:id="rId15"/>
+    <p:sldId id="267" r:id="rId16"/>
+    <p:sldId id="263" r:id="rId17"/>
+    <p:sldId id="265" r:id="rId18"/>
+    <p:sldId id="266" r:id="rId19"/>
+    <p:sldId id="268" r:id="rId20"/>
+    <p:sldId id="275" r:id="rId21"/>
+    <p:sldId id="298" r:id="rId22"/>
+    <p:sldId id="318" r:id="rId23"/>
+    <p:sldId id="292" r:id="rId24"/>
+    <p:sldId id="293" r:id="rId25"/>
+    <p:sldId id="294" r:id="rId26"/>
+    <p:sldId id="308" r:id="rId27"/>
+    <p:sldId id="303" r:id="rId28"/>
+    <p:sldId id="304" r:id="rId29"/>
+    <p:sldId id="309" r:id="rId30"/>
+    <p:sldId id="310" r:id="rId31"/>
+    <p:sldId id="311" r:id="rId32"/>
+    <p:sldId id="325" r:id="rId33"/>
+    <p:sldId id="330" r:id="rId34"/>
+    <p:sldId id="326" r:id="rId35"/>
   </p:sldIdLst>
   <p:sldSz cx="9144000" cy="6858000" type="screen4x3"/>
   <p:notesSz cx="6858000" cy="9144000"/>
@@ -224,7 +225,7 @@
           <a:p>
             <a:fld id="{30446AFF-38F8-492F-AB5B-504E24802E47}" type="datetimeFigureOut">
               <a:rPr lang="en-US" smtClean="0"/>
-              <a:t>11/20/2015</a:t>
+              <a:t>11/21/2015</a:t>
             </a:fld>
             <a:endParaRPr lang="en-US"/>
           </a:p>
@@ -757,7 +758,7 @@
           <a:p>
             <a:fld id="{AB94029E-6FCD-4D3D-AE41-24E942A5DE05}" type="datetimeFigureOut">
               <a:rPr lang="en-US" smtClean="0"/>
-              <a:t>11/20/2015</a:t>
+              <a:t>11/21/2015</a:t>
             </a:fld>
             <a:endParaRPr lang="en-US"/>
           </a:p>
@@ -808,7 +809,7 @@
     </p:spTree>
     <p:extLst>
       <p:ext uri="{BB962C8B-B14F-4D97-AF65-F5344CB8AC3E}">
-        <p14:creationId xmlns:p14="http://schemas.microsoft.com/office/powerpoint/2010/main" val="3771210590"/>
+        <p14:creationId xmlns:p14="http://schemas.microsoft.com/office/powerpoint/2010/main" val="3341827216"/>
       </p:ext>
     </p:extLst>
   </p:cSld>
@@ -927,7 +928,7 @@
           <a:p>
             <a:fld id="{AB94029E-6FCD-4D3D-AE41-24E942A5DE05}" type="datetimeFigureOut">
               <a:rPr lang="en-US" smtClean="0"/>
-              <a:t>11/20/2015</a:t>
+              <a:t>11/21/2015</a:t>
             </a:fld>
             <a:endParaRPr lang="en-US"/>
           </a:p>
@@ -978,7 +979,7 @@
     </p:spTree>
     <p:extLst>
       <p:ext uri="{BB962C8B-B14F-4D97-AF65-F5344CB8AC3E}">
-        <p14:creationId xmlns:p14="http://schemas.microsoft.com/office/powerpoint/2010/main" val="4128804024"/>
+        <p14:creationId xmlns:p14="http://schemas.microsoft.com/office/powerpoint/2010/main" val="2281913931"/>
       </p:ext>
     </p:extLst>
   </p:cSld>
@@ -1107,7 +1108,7 @@
           <a:p>
             <a:fld id="{AB94029E-6FCD-4D3D-AE41-24E942A5DE05}" type="datetimeFigureOut">
               <a:rPr lang="en-US" smtClean="0"/>
-              <a:t>11/20/2015</a:t>
+              <a:t>11/21/2015</a:t>
             </a:fld>
             <a:endParaRPr lang="en-US"/>
           </a:p>
@@ -1158,7 +1159,7 @@
     </p:spTree>
     <p:extLst>
       <p:ext uri="{BB962C8B-B14F-4D97-AF65-F5344CB8AC3E}">
-        <p14:creationId xmlns:p14="http://schemas.microsoft.com/office/powerpoint/2010/main" val="4222728467"/>
+        <p14:creationId xmlns:p14="http://schemas.microsoft.com/office/powerpoint/2010/main" val="546836083"/>
       </p:ext>
     </p:extLst>
   </p:cSld>
@@ -1277,7 +1278,7 @@
           <a:p>
             <a:fld id="{AB94029E-6FCD-4D3D-AE41-24E942A5DE05}" type="datetimeFigureOut">
               <a:rPr lang="en-US" smtClean="0"/>
-              <a:t>11/20/2015</a:t>
+              <a:t>11/21/2015</a:t>
             </a:fld>
             <a:endParaRPr lang="en-US"/>
           </a:p>
@@ -1328,7 +1329,7 @@
     </p:spTree>
     <p:extLst>
       <p:ext uri="{BB962C8B-B14F-4D97-AF65-F5344CB8AC3E}">
-        <p14:creationId xmlns:p14="http://schemas.microsoft.com/office/powerpoint/2010/main" val="2642663720"/>
+        <p14:creationId xmlns:p14="http://schemas.microsoft.com/office/powerpoint/2010/main" val="2755041064"/>
       </p:ext>
     </p:extLst>
   </p:cSld>
@@ -1523,7 +1524,7 @@
           <a:p>
             <a:fld id="{AB94029E-6FCD-4D3D-AE41-24E942A5DE05}" type="datetimeFigureOut">
               <a:rPr lang="en-US" smtClean="0"/>
-              <a:t>11/20/2015</a:t>
+              <a:t>11/21/2015</a:t>
             </a:fld>
             <a:endParaRPr lang="en-US"/>
           </a:p>
@@ -1574,7 +1575,7 @@
     </p:spTree>
     <p:extLst>
       <p:ext uri="{BB962C8B-B14F-4D97-AF65-F5344CB8AC3E}">
-        <p14:creationId xmlns:p14="http://schemas.microsoft.com/office/powerpoint/2010/main" val="1103732515"/>
+        <p14:creationId xmlns:p14="http://schemas.microsoft.com/office/powerpoint/2010/main" val="2173571989"/>
       </p:ext>
     </p:extLst>
   </p:cSld>
@@ -1811,7 +1812,7 @@
           <a:p>
             <a:fld id="{AB94029E-6FCD-4D3D-AE41-24E942A5DE05}" type="datetimeFigureOut">
               <a:rPr lang="en-US" smtClean="0"/>
-              <a:t>11/20/2015</a:t>
+              <a:t>11/21/2015</a:t>
             </a:fld>
             <a:endParaRPr lang="en-US"/>
           </a:p>
@@ -1862,7 +1863,7 @@
     </p:spTree>
     <p:extLst>
       <p:ext uri="{BB962C8B-B14F-4D97-AF65-F5344CB8AC3E}">
-        <p14:creationId xmlns:p14="http://schemas.microsoft.com/office/powerpoint/2010/main" val="2759320291"/>
+        <p14:creationId xmlns:p14="http://schemas.microsoft.com/office/powerpoint/2010/main" val="38906184"/>
       </p:ext>
     </p:extLst>
   </p:cSld>
@@ -2233,7 +2234,7 @@
           <a:p>
             <a:fld id="{AB94029E-6FCD-4D3D-AE41-24E942A5DE05}" type="datetimeFigureOut">
               <a:rPr lang="en-US" smtClean="0"/>
-              <a:t>11/20/2015</a:t>
+              <a:t>11/21/2015</a:t>
             </a:fld>
             <a:endParaRPr lang="en-US"/>
           </a:p>
@@ -2284,7 +2285,7 @@
     </p:spTree>
     <p:extLst>
       <p:ext uri="{BB962C8B-B14F-4D97-AF65-F5344CB8AC3E}">
-        <p14:creationId xmlns:p14="http://schemas.microsoft.com/office/powerpoint/2010/main" val="3488510741"/>
+        <p14:creationId xmlns:p14="http://schemas.microsoft.com/office/powerpoint/2010/main" val="3081227223"/>
       </p:ext>
     </p:extLst>
   </p:cSld>
@@ -2351,7 +2352,7 @@
           <a:p>
             <a:fld id="{AB94029E-6FCD-4D3D-AE41-24E942A5DE05}" type="datetimeFigureOut">
               <a:rPr lang="en-US" smtClean="0"/>
-              <a:t>11/20/2015</a:t>
+              <a:t>11/21/2015</a:t>
             </a:fld>
             <a:endParaRPr lang="en-US"/>
           </a:p>
@@ -2402,7 +2403,7 @@
     </p:spTree>
     <p:extLst>
       <p:ext uri="{BB962C8B-B14F-4D97-AF65-F5344CB8AC3E}">
-        <p14:creationId xmlns:p14="http://schemas.microsoft.com/office/powerpoint/2010/main" val="2814158750"/>
+        <p14:creationId xmlns:p14="http://schemas.microsoft.com/office/powerpoint/2010/main" val="1587147853"/>
       </p:ext>
     </p:extLst>
   </p:cSld>
@@ -2446,7 +2447,7 @@
           <a:p>
             <a:fld id="{AB94029E-6FCD-4D3D-AE41-24E942A5DE05}" type="datetimeFigureOut">
               <a:rPr lang="en-US" smtClean="0"/>
-              <a:t>11/20/2015</a:t>
+              <a:t>11/21/2015</a:t>
             </a:fld>
             <a:endParaRPr lang="en-US"/>
           </a:p>
@@ -2497,7 +2498,7 @@
     </p:spTree>
     <p:extLst>
       <p:ext uri="{BB962C8B-B14F-4D97-AF65-F5344CB8AC3E}">
-        <p14:creationId xmlns:p14="http://schemas.microsoft.com/office/powerpoint/2010/main" val="3790549894"/>
+        <p14:creationId xmlns:p14="http://schemas.microsoft.com/office/powerpoint/2010/main" val="603850613"/>
       </p:ext>
     </p:extLst>
   </p:cSld>
@@ -2723,7 +2724,7 @@
           <a:p>
             <a:fld id="{AB94029E-6FCD-4D3D-AE41-24E942A5DE05}" type="datetimeFigureOut">
               <a:rPr lang="en-US" smtClean="0"/>
-              <a:t>11/20/2015</a:t>
+              <a:t>11/21/2015</a:t>
             </a:fld>
             <a:endParaRPr lang="en-US"/>
           </a:p>
@@ -2774,7 +2775,7 @@
     </p:spTree>
     <p:extLst>
       <p:ext uri="{BB962C8B-B14F-4D97-AF65-F5344CB8AC3E}">
-        <p14:creationId xmlns:p14="http://schemas.microsoft.com/office/powerpoint/2010/main" val="520665160"/>
+        <p14:creationId xmlns:p14="http://schemas.microsoft.com/office/powerpoint/2010/main" val="21373133"/>
       </p:ext>
     </p:extLst>
   </p:cSld>
@@ -2976,7 +2977,7 @@
           <a:p>
             <a:fld id="{AB94029E-6FCD-4D3D-AE41-24E942A5DE05}" type="datetimeFigureOut">
               <a:rPr lang="en-US" smtClean="0"/>
-              <a:t>11/20/2015</a:t>
+              <a:t>11/21/2015</a:t>
             </a:fld>
             <a:endParaRPr lang="en-US"/>
           </a:p>
@@ -3027,7 +3028,7 @@
     </p:spTree>
     <p:extLst>
       <p:ext uri="{BB962C8B-B14F-4D97-AF65-F5344CB8AC3E}">
-        <p14:creationId xmlns:p14="http://schemas.microsoft.com/office/powerpoint/2010/main" val="2695261976"/>
+        <p14:creationId xmlns:p14="http://schemas.microsoft.com/office/powerpoint/2010/main" val="3439286133"/>
       </p:ext>
     </p:extLst>
   </p:cSld>
@@ -3189,7 +3190,7 @@
           <a:p>
             <a:fld id="{AB94029E-6FCD-4D3D-AE41-24E942A5DE05}" type="datetimeFigureOut">
               <a:rPr lang="en-US" smtClean="0"/>
-              <a:t>11/20/2015</a:t>
+              <a:t>11/21/2015</a:t>
             </a:fld>
             <a:endParaRPr lang="en-US"/>
           </a:p>
@@ -3276,23 +3277,23 @@
     </p:spTree>
     <p:extLst>
       <p:ext uri="{BB962C8B-B14F-4D97-AF65-F5344CB8AC3E}">
-        <p14:creationId xmlns:p14="http://schemas.microsoft.com/office/powerpoint/2010/main" val="3200778447"/>
+        <p14:creationId xmlns:p14="http://schemas.microsoft.com/office/powerpoint/2010/main" val="1653467772"/>
       </p:ext>
     </p:extLst>
   </p:cSld>
   <p:clrMap bg1="lt1" tx1="dk1" bg2="lt2" tx2="dk2" accent1="accent1" accent2="accent2" accent3="accent3" accent4="accent4" accent5="accent5" accent6="accent6" hlink="hlink" folHlink="folHlink"/>
   <p:sldLayoutIdLst>
-    <p:sldLayoutId id="2147483649" r:id="rId1"/>
-    <p:sldLayoutId id="2147483650" r:id="rId2"/>
-    <p:sldLayoutId id="2147483651" r:id="rId3"/>
-    <p:sldLayoutId id="2147483652" r:id="rId4"/>
-    <p:sldLayoutId id="2147483653" r:id="rId5"/>
-    <p:sldLayoutId id="2147483654" r:id="rId6"/>
-    <p:sldLayoutId id="2147483655" r:id="rId7"/>
-    <p:sldLayoutId id="2147483656" r:id="rId8"/>
-    <p:sldLayoutId id="2147483657" r:id="rId9"/>
-    <p:sldLayoutId id="2147483658" r:id="rId10"/>
-    <p:sldLayoutId id="2147483659" r:id="rId11"/>
+    <p:sldLayoutId id="2147483673" r:id="rId1"/>
+    <p:sldLayoutId id="2147483674" r:id="rId2"/>
+    <p:sldLayoutId id="2147483675" r:id="rId3"/>
+    <p:sldLayoutId id="2147483676" r:id="rId4"/>
+    <p:sldLayoutId id="2147483677" r:id="rId5"/>
+    <p:sldLayoutId id="2147483678" r:id="rId6"/>
+    <p:sldLayoutId id="2147483679" r:id="rId7"/>
+    <p:sldLayoutId id="2147483680" r:id="rId8"/>
+    <p:sldLayoutId id="2147483681" r:id="rId9"/>
+    <p:sldLayoutId id="2147483682" r:id="rId10"/>
+    <p:sldLayoutId id="2147483683" r:id="rId11"/>
   </p:sldLayoutIdLst>
   <p:txStyles>
     <p:titleStyle>
@@ -3724,6 +3725,84 @@
       </p:grpSpPr>
       <p:pic>
         <p:nvPicPr>
+          <p:cNvPr id="2" name="Picture 1" descr="C:\Users\Bob Gorman\AppData\Local\Skitch\Screenshot_111315_060830_PM.jpg"/>
+          <p:cNvPicPr>
+            <a:picLocks noChangeAspect="1" noChangeArrowheads="1"/>
+          </p:cNvPicPr>
+          <p:nvPr/>
+        </p:nvPicPr>
+        <p:blipFill>
+          <a:blip r:embed="rId2">
+            <a:extLst>
+              <a:ext uri="{28A0092B-C50C-407E-A947-70E740481C1C}">
+                <a14:useLocalDpi xmlns:a14="http://schemas.microsoft.com/office/drawing/2010/main" val="0"/>
+              </a:ext>
+            </a:extLst>
+          </a:blip>
+          <a:srcRect/>
+          <a:stretch>
+            <a:fillRect/>
+          </a:stretch>
+        </p:blipFill>
+        <p:spPr bwMode="auto">
+          <a:xfrm>
+            <a:off x="457200" y="1524000"/>
+            <a:ext cx="8382000" cy="896565"/>
+          </a:xfrm>
+          <a:prstGeom prst="rect">
+            <a:avLst/>
+          </a:prstGeom>
+          <a:noFill/>
+          <a:extLst>
+            <a:ext uri="{909E8E84-426E-40DD-AFC4-6F175D3DCCD1}">
+              <a14:hiddenFill xmlns:a14="http://schemas.microsoft.com/office/drawing/2010/main">
+                <a:solidFill>
+                  <a:srgbClr val="FFFFFF"/>
+                </a:solidFill>
+              </a14:hiddenFill>
+            </a:ext>
+          </a:extLst>
+        </p:spPr>
+      </p:pic>
+    </p:spTree>
+    <p:extLst>
+      <p:ext uri="{BB962C8B-B14F-4D97-AF65-F5344CB8AC3E}">
+        <p14:creationId xmlns:p14="http://schemas.microsoft.com/office/powerpoint/2010/main" val="437755951"/>
+      </p:ext>
+    </p:extLst>
+  </p:cSld>
+  <p:clrMapOvr>
+    <a:masterClrMapping/>
+  </p:clrMapOvr>
+  <p:timing>
+    <p:tnLst>
+      <p:par>
+        <p:cTn id="1" dur="indefinite" restart="never" nodeType="tmRoot"/>
+      </p:par>
+    </p:tnLst>
+  </p:timing>
+</p:sld>
+</file>
+
+<file path=ppt/slides/slide11.xml><?xml version="1.0" encoding="utf-8"?>
+<p:sld xmlns:a="http://schemas.openxmlformats.org/drawingml/2006/main" xmlns:r="http://schemas.openxmlformats.org/officeDocument/2006/relationships" xmlns:p="http://schemas.openxmlformats.org/presentationml/2006/main">
+  <p:cSld>
+    <p:spTree>
+      <p:nvGrpSpPr>
+        <p:cNvPr id="1" name=""/>
+        <p:cNvGrpSpPr/>
+        <p:nvPr/>
+      </p:nvGrpSpPr>
+      <p:grpSpPr>
+        <a:xfrm>
+          <a:off x="0" y="0"/>
+          <a:ext cx="0" cy="0"/>
+          <a:chOff x="0" y="0"/>
+          <a:chExt cx="0" cy="0"/>
+        </a:xfrm>
+      </p:grpSpPr>
+      <p:pic>
+        <p:nvPicPr>
           <p:cNvPr id="7170" name="Picture 2" descr="C:\Users\BOBGOR~1\AppData\Local\Temp\Screenshot_030715_103606_AM.jpg"/>
           <p:cNvPicPr>
             <a:picLocks noChangeAspect="1" noChangeArrowheads="1"/>
@@ -3795,7 +3874,7 @@
 </p:sld>
 </file>
 
-<file path=ppt/slides/slide11.xml><?xml version="1.0" encoding="utf-8"?>
+<file path=ppt/slides/slide12.xml><?xml version="1.0" encoding="utf-8"?>
 <p:sld xmlns:a="http://schemas.openxmlformats.org/drawingml/2006/main" xmlns:r="http://schemas.openxmlformats.org/officeDocument/2006/relationships" xmlns:p="http://schemas.openxmlformats.org/presentationml/2006/main">
   <p:cSld>
     <p:spTree>
@@ -3996,7 +4075,7 @@
 </p:sld>
 </file>
 
-<file path=ppt/slides/slide12.xml><?xml version="1.0" encoding="utf-8"?>
+<file path=ppt/slides/slide13.xml><?xml version="1.0" encoding="utf-8"?>
 <p:sld xmlns:a="http://schemas.openxmlformats.org/drawingml/2006/main" xmlns:r="http://schemas.openxmlformats.org/officeDocument/2006/relationships" xmlns:p="http://schemas.openxmlformats.org/presentationml/2006/main">
   <p:cSld>
     <p:spTree>
@@ -4074,7 +4153,7 @@
 </p:sld>
 </file>
 
-<file path=ppt/slides/slide13.xml><?xml version="1.0" encoding="utf-8"?>
+<file path=ppt/slides/slide14.xml><?xml version="1.0" encoding="utf-8"?>
 <p:sld xmlns:a="http://schemas.openxmlformats.org/drawingml/2006/main" xmlns:r="http://schemas.openxmlformats.org/officeDocument/2006/relationships" xmlns:p="http://schemas.openxmlformats.org/presentationml/2006/main">
   <p:cSld>
     <p:spTree>
@@ -4152,7 +4231,7 @@
 </p:sld>
 </file>
 
-<file path=ppt/slides/slide14.xml><?xml version="1.0" encoding="utf-8"?>
+<file path=ppt/slides/slide15.xml><?xml version="1.0" encoding="utf-8"?>
 <p:sld xmlns:a="http://schemas.openxmlformats.org/drawingml/2006/main" xmlns:r="http://schemas.openxmlformats.org/officeDocument/2006/relationships" xmlns:p="http://schemas.openxmlformats.org/presentationml/2006/main">
   <p:cSld>
     <p:spTree>
@@ -4230,7 +4309,7 @@
 </p:sld>
 </file>
 
-<file path=ppt/slides/slide15.xml><?xml version="1.0" encoding="utf-8"?>
+<file path=ppt/slides/slide16.xml><?xml version="1.0" encoding="utf-8"?>
 <p:sld xmlns:a="http://schemas.openxmlformats.org/drawingml/2006/main" xmlns:r="http://schemas.openxmlformats.org/officeDocument/2006/relationships" xmlns:p="http://schemas.openxmlformats.org/presentationml/2006/main">
   <p:cSld>
     <p:spTree>
@@ -4308,7 +4387,7 @@
 </p:sld>
 </file>
 
-<file path=ppt/slides/slide16.xml><?xml version="1.0" encoding="utf-8"?>
+<file path=ppt/slides/slide17.xml><?xml version="1.0" encoding="utf-8"?>
 <p:sld xmlns:a="http://schemas.openxmlformats.org/drawingml/2006/main" xmlns:r="http://schemas.openxmlformats.org/officeDocument/2006/relationships" xmlns:p="http://schemas.openxmlformats.org/presentationml/2006/main">
   <p:cSld>
     <p:spTree>
@@ -4453,7 +4532,7 @@
 </p:sld>
 </file>
 
-<file path=ppt/slides/slide17.xml><?xml version="1.0" encoding="utf-8"?>
+<file path=ppt/slides/slide18.xml><?xml version="1.0" encoding="utf-8"?>
 <p:sld xmlns:a="http://schemas.openxmlformats.org/drawingml/2006/main" xmlns:r="http://schemas.openxmlformats.org/officeDocument/2006/relationships" xmlns:p="http://schemas.openxmlformats.org/presentationml/2006/main">
   <p:cSld>
     <p:spTree>
@@ -4531,7 +4610,7 @@
 </p:sld>
 </file>
 
-<file path=ppt/slides/slide18.xml><?xml version="1.0" encoding="utf-8"?>
+<file path=ppt/slides/slide19.xml><?xml version="1.0" encoding="utf-8"?>
 <p:sld xmlns:a="http://schemas.openxmlformats.org/drawingml/2006/main" xmlns:r="http://schemas.openxmlformats.org/officeDocument/2006/relationships" xmlns:p="http://schemas.openxmlformats.org/presentationml/2006/main">
   <p:cSld>
     <p:spTree>
@@ -4609,7 +4688,205 @@
 </p:sld>
 </file>
 
-<file path=ppt/slides/slide19.xml><?xml version="1.0" encoding="utf-8"?>
+<file path=ppt/slides/slide2.xml><?xml version="1.0" encoding="utf-8"?>
+<p:sld xmlns:a="http://schemas.openxmlformats.org/drawingml/2006/main" xmlns:r="http://schemas.openxmlformats.org/officeDocument/2006/relationships" xmlns:p="http://schemas.openxmlformats.org/presentationml/2006/main">
+  <p:cSld>
+    <p:spTree>
+      <p:nvGrpSpPr>
+        <p:cNvPr id="1" name=""/>
+        <p:cNvGrpSpPr/>
+        <p:nvPr/>
+      </p:nvGrpSpPr>
+      <p:grpSpPr>
+        <a:xfrm>
+          <a:off x="0" y="0"/>
+          <a:ext cx="0" cy="0"/>
+          <a:chOff x="0" y="0"/>
+          <a:chExt cx="0" cy="0"/>
+        </a:xfrm>
+      </p:grpSpPr>
+      <p:sp>
+        <p:nvSpPr>
+          <p:cNvPr id="2" name="TextBox 1"/>
+          <p:cNvSpPr txBox="1"/>
+          <p:nvPr/>
+        </p:nvSpPr>
+        <p:spPr>
+          <a:xfrm>
+            <a:off x="990600" y="1143000"/>
+            <a:ext cx="7315200" cy="954107"/>
+          </a:xfrm>
+          <a:prstGeom prst="rect">
+            <a:avLst/>
+          </a:prstGeom>
+          <a:noFill/>
+        </p:spPr>
+        <p:txBody>
+          <a:bodyPr wrap="square" rtlCol="0">
+            <a:spAutoFit/>
+          </a:bodyPr>
+          <a:lstStyle/>
+          <a:p>
+            <a:r>
+              <a:rPr lang="en-US" sz="2800" dirty="0" smtClean="0"/>
+              <a:t>Starting point: how to evaluate ancient reuse of lost texts?</a:t>
+            </a:r>
+            <a:endParaRPr lang="en-US" sz="2800" dirty="0"/>
+          </a:p>
+        </p:txBody>
+      </p:sp>
+      <p:sp>
+        <p:nvSpPr>
+          <p:cNvPr id="3" name="Rectangle 2"/>
+          <p:cNvSpPr/>
+          <p:nvPr/>
+        </p:nvSpPr>
+        <p:spPr>
+          <a:xfrm>
+            <a:off x="765699" y="2228671"/>
+            <a:ext cx="7543800" cy="2677656"/>
+          </a:xfrm>
+          <a:prstGeom prst="rect">
+            <a:avLst/>
+          </a:prstGeom>
+        </p:spPr>
+        <p:txBody>
+          <a:bodyPr wrap="square">
+            <a:spAutoFit/>
+          </a:bodyPr>
+          <a:lstStyle/>
+          <a:p>
+            <a:r>
+              <a:rPr lang="en-US" sz="2400" dirty="0" err="1" smtClean="0"/>
+              <a:t>Athenaeus</a:t>
+            </a:r>
+            <a:r>
+              <a:rPr lang="en-US" sz="2400" dirty="0" smtClean="0"/>
+              <a:t> 12.41, </a:t>
+            </a:r>
+            <a:r>
+              <a:rPr lang="en-US" sz="2400" dirty="0" err="1" smtClean="0"/>
+              <a:t>Θεό</a:t>
+            </a:r>
+            <a:r>
+              <a:rPr lang="en-US" sz="2400" dirty="0" smtClean="0"/>
+              <a:t>πομπος </a:t>
+            </a:r>
+            <a:r>
+              <a:rPr lang="en-US" sz="2400" dirty="0"/>
+              <a:t>δ' ἐν πεντεκαιδεκάτῃ Φιλιππικῶν Ἱστοριῶν </a:t>
+            </a:r>
+            <a:r>
+              <a:rPr lang="el-GR" sz="2400" dirty="0"/>
+              <a:t>Στράτωνα</a:t>
+            </a:r>
+            <a:r>
+              <a:rPr lang="en-US" sz="2400" dirty="0"/>
+              <a:t> </a:t>
+            </a:r>
+            <a:r>
+              <a:rPr lang="en-US" sz="2400" dirty="0" err="1"/>
+              <a:t>φησι</a:t>
+            </a:r>
+            <a:r>
+              <a:rPr lang="en-US" sz="2400" dirty="0"/>
+              <a:t> </a:t>
+            </a:r>
+            <a:r>
+              <a:rPr lang="en-US" sz="2400" dirty="0" err="1"/>
+              <a:t>τὸν</a:t>
+            </a:r>
+            <a:r>
+              <a:rPr lang="en-US" sz="2400" dirty="0"/>
+              <a:t> </a:t>
+            </a:r>
+            <a:r>
+              <a:rPr lang="en-US" sz="2400" dirty="0" err="1"/>
+              <a:t>Σιδώνιον</a:t>
+            </a:r>
+            <a:r>
+              <a:rPr lang="en-US" sz="2400" dirty="0"/>
+              <a:t> βα</a:t>
+            </a:r>
+            <a:r>
+              <a:rPr lang="en-US" sz="2400" dirty="0" err="1"/>
+              <a:t>σιλέ</a:t>
+            </a:r>
+            <a:r>
+              <a:rPr lang="en-US" sz="2400" dirty="0"/>
+              <a:t>α ὑπερβάλλειν ἡδυπαθείᾳ καὶ τρυφῇ πάντας ἀνθρώπους</a:t>
+            </a:r>
+            <a:r>
+              <a:rPr lang="en-US" sz="2400" dirty="0" smtClean="0"/>
+              <a:t>.</a:t>
+            </a:r>
+            <a:br>
+              <a:rPr lang="en-US" sz="2400" dirty="0" smtClean="0"/>
+            </a:br>
+            <a:r>
+              <a:rPr lang="en-US" sz="2400" dirty="0" smtClean="0"/>
+              <a:t/>
+            </a:r>
+            <a:br>
+              <a:rPr lang="en-US" sz="2400" dirty="0" smtClean="0"/>
+            </a:br>
+            <a:r>
+              <a:rPr lang="en-US" sz="2400" dirty="0" err="1" smtClean="0"/>
+              <a:t>Theopompus</a:t>
+            </a:r>
+            <a:r>
+              <a:rPr lang="en-US" sz="2400" dirty="0" smtClean="0"/>
+              <a:t> in the 15</a:t>
+            </a:r>
+            <a:r>
+              <a:rPr lang="en-US" sz="2400" baseline="30000" dirty="0" smtClean="0"/>
+              <a:t>th</a:t>
+            </a:r>
+            <a:r>
+              <a:rPr lang="en-US" sz="2400" dirty="0" smtClean="0"/>
+              <a:t> book of his Philippic Histories says that </a:t>
+            </a:r>
+            <a:r>
+              <a:rPr lang="en-US" sz="2400" dirty="0" err="1" smtClean="0"/>
+              <a:t>Straton</a:t>
+            </a:r>
+            <a:r>
+              <a:rPr lang="en-US" sz="2400" dirty="0" smtClean="0"/>
+              <a:t>, the </a:t>
+            </a:r>
+            <a:r>
+              <a:rPr lang="en-US" sz="2400" dirty="0" err="1" smtClean="0"/>
+              <a:t>Sidonian</a:t>
+            </a:r>
+            <a:r>
+              <a:rPr lang="en-US" sz="2400" dirty="0" smtClean="0"/>
+              <a:t> king, surpassed all people in extravagance and self-indulgence. </a:t>
+            </a:r>
+            <a:endParaRPr lang="en-US" sz="2400" dirty="0"/>
+          </a:p>
+        </p:txBody>
+      </p:sp>
+    </p:spTree>
+    <p:extLst>
+      <p:ext uri="{BB962C8B-B14F-4D97-AF65-F5344CB8AC3E}">
+        <p14:creationId xmlns:p14="http://schemas.microsoft.com/office/powerpoint/2010/main" val="1519797498"/>
+      </p:ext>
+    </p:extLst>
+  </p:cSld>
+  <p:clrMapOvr>
+    <a:masterClrMapping/>
+  </p:clrMapOvr>
+  <p:timing>
+    <p:tnLst>
+      <p:par>
+        <p:cTn id="1" dur="indefinite" restart="never" nodeType="tmRoot"/>
+      </p:par>
+    </p:tnLst>
+  </p:timing>
+</p:sld>
+</file>
+
+<file path=ppt/slides/slide20.xml><?xml version="1.0" encoding="utf-8"?>
 <p:sld xmlns:a="http://schemas.openxmlformats.org/drawingml/2006/main" xmlns:r="http://schemas.openxmlformats.org/officeDocument/2006/relationships" xmlns:p="http://schemas.openxmlformats.org/presentationml/2006/main">
   <p:cSld>
     <p:spTree>
@@ -4769,205 +5046,7 @@
 </p:sld>
 </file>
 
-<file path=ppt/slides/slide2.xml><?xml version="1.0" encoding="utf-8"?>
-<p:sld xmlns:a="http://schemas.openxmlformats.org/drawingml/2006/main" xmlns:r="http://schemas.openxmlformats.org/officeDocument/2006/relationships" xmlns:p="http://schemas.openxmlformats.org/presentationml/2006/main">
-  <p:cSld>
-    <p:spTree>
-      <p:nvGrpSpPr>
-        <p:cNvPr id="1" name=""/>
-        <p:cNvGrpSpPr/>
-        <p:nvPr/>
-      </p:nvGrpSpPr>
-      <p:grpSpPr>
-        <a:xfrm>
-          <a:off x="0" y="0"/>
-          <a:ext cx="0" cy="0"/>
-          <a:chOff x="0" y="0"/>
-          <a:chExt cx="0" cy="0"/>
-        </a:xfrm>
-      </p:grpSpPr>
-      <p:sp>
-        <p:nvSpPr>
-          <p:cNvPr id="2" name="TextBox 1"/>
-          <p:cNvSpPr txBox="1"/>
-          <p:nvPr/>
-        </p:nvSpPr>
-        <p:spPr>
-          <a:xfrm>
-            <a:off x="990600" y="1143000"/>
-            <a:ext cx="7315200" cy="954107"/>
-          </a:xfrm>
-          <a:prstGeom prst="rect">
-            <a:avLst/>
-          </a:prstGeom>
-          <a:noFill/>
-        </p:spPr>
-        <p:txBody>
-          <a:bodyPr wrap="square" rtlCol="0">
-            <a:spAutoFit/>
-          </a:bodyPr>
-          <a:lstStyle/>
-          <a:p>
-            <a:r>
-              <a:rPr lang="en-US" sz="2800" dirty="0" smtClean="0"/>
-              <a:t>Starting point: how to evaluate ancient reuse of lost texts?</a:t>
-            </a:r>
-            <a:endParaRPr lang="en-US" sz="2800" dirty="0"/>
-          </a:p>
-        </p:txBody>
-      </p:sp>
-      <p:sp>
-        <p:nvSpPr>
-          <p:cNvPr id="3" name="Rectangle 2"/>
-          <p:cNvSpPr/>
-          <p:nvPr/>
-        </p:nvSpPr>
-        <p:spPr>
-          <a:xfrm>
-            <a:off x="765699" y="2228671"/>
-            <a:ext cx="7543800" cy="2677656"/>
-          </a:xfrm>
-          <a:prstGeom prst="rect">
-            <a:avLst/>
-          </a:prstGeom>
-        </p:spPr>
-        <p:txBody>
-          <a:bodyPr wrap="square">
-            <a:spAutoFit/>
-          </a:bodyPr>
-          <a:lstStyle/>
-          <a:p>
-            <a:r>
-              <a:rPr lang="en-US" sz="2400" dirty="0" err="1" smtClean="0"/>
-              <a:t>Athenaeus</a:t>
-            </a:r>
-            <a:r>
-              <a:rPr lang="en-US" sz="2400" dirty="0" smtClean="0"/>
-              <a:t> 12.41, </a:t>
-            </a:r>
-            <a:r>
-              <a:rPr lang="en-US" sz="2400" dirty="0" err="1" smtClean="0"/>
-              <a:t>Θεό</a:t>
-            </a:r>
-            <a:r>
-              <a:rPr lang="en-US" sz="2400" dirty="0" smtClean="0"/>
-              <a:t>πομπος </a:t>
-            </a:r>
-            <a:r>
-              <a:rPr lang="en-US" sz="2400" dirty="0"/>
-              <a:t>δ' ἐν πεντεκαιδεκάτῃ Φιλιππικῶν Ἱστοριῶν </a:t>
-            </a:r>
-            <a:r>
-              <a:rPr lang="el-GR" sz="2400" dirty="0"/>
-              <a:t>Στράτωνα</a:t>
-            </a:r>
-            <a:r>
-              <a:rPr lang="en-US" sz="2400" dirty="0"/>
-              <a:t> </a:t>
-            </a:r>
-            <a:r>
-              <a:rPr lang="en-US" sz="2400" dirty="0" err="1"/>
-              <a:t>φησι</a:t>
-            </a:r>
-            <a:r>
-              <a:rPr lang="en-US" sz="2400" dirty="0"/>
-              <a:t> </a:t>
-            </a:r>
-            <a:r>
-              <a:rPr lang="en-US" sz="2400" dirty="0" err="1"/>
-              <a:t>τὸν</a:t>
-            </a:r>
-            <a:r>
-              <a:rPr lang="en-US" sz="2400" dirty="0"/>
-              <a:t> </a:t>
-            </a:r>
-            <a:r>
-              <a:rPr lang="en-US" sz="2400" dirty="0" err="1"/>
-              <a:t>Σιδώνιον</a:t>
-            </a:r>
-            <a:r>
-              <a:rPr lang="en-US" sz="2400" dirty="0"/>
-              <a:t> βα</a:t>
-            </a:r>
-            <a:r>
-              <a:rPr lang="en-US" sz="2400" dirty="0" err="1"/>
-              <a:t>σιλέ</a:t>
-            </a:r>
-            <a:r>
-              <a:rPr lang="en-US" sz="2400" dirty="0"/>
-              <a:t>α ὑπερβάλλειν ἡδυπαθείᾳ καὶ τρυφῇ πάντας ἀνθρώπους</a:t>
-            </a:r>
-            <a:r>
-              <a:rPr lang="en-US" sz="2400" dirty="0" smtClean="0"/>
-              <a:t>.</a:t>
-            </a:r>
-            <a:br>
-              <a:rPr lang="en-US" sz="2400" dirty="0" smtClean="0"/>
-            </a:br>
-            <a:r>
-              <a:rPr lang="en-US" sz="2400" dirty="0" smtClean="0"/>
-              <a:t/>
-            </a:r>
-            <a:br>
-              <a:rPr lang="en-US" sz="2400" dirty="0" smtClean="0"/>
-            </a:br>
-            <a:r>
-              <a:rPr lang="en-US" sz="2400" dirty="0" err="1" smtClean="0"/>
-              <a:t>Theopompus</a:t>
-            </a:r>
-            <a:r>
-              <a:rPr lang="en-US" sz="2400" dirty="0" smtClean="0"/>
-              <a:t> in the 15</a:t>
-            </a:r>
-            <a:r>
-              <a:rPr lang="en-US" sz="2400" baseline="30000" dirty="0" smtClean="0"/>
-              <a:t>th</a:t>
-            </a:r>
-            <a:r>
-              <a:rPr lang="en-US" sz="2400" dirty="0" smtClean="0"/>
-              <a:t> book of his Philippic Histories says that </a:t>
-            </a:r>
-            <a:r>
-              <a:rPr lang="en-US" sz="2400" dirty="0" err="1" smtClean="0"/>
-              <a:t>Straton</a:t>
-            </a:r>
-            <a:r>
-              <a:rPr lang="en-US" sz="2400" dirty="0" smtClean="0"/>
-              <a:t>, the </a:t>
-            </a:r>
-            <a:r>
-              <a:rPr lang="en-US" sz="2400" dirty="0" err="1" smtClean="0"/>
-              <a:t>Sidonian</a:t>
-            </a:r>
-            <a:r>
-              <a:rPr lang="en-US" sz="2400" dirty="0" smtClean="0"/>
-              <a:t> king, surpassed all people in extravagance and self-indulgence. </a:t>
-            </a:r>
-            <a:endParaRPr lang="en-US" sz="2400" dirty="0"/>
-          </a:p>
-        </p:txBody>
-      </p:sp>
-    </p:spTree>
-    <p:extLst>
-      <p:ext uri="{BB962C8B-B14F-4D97-AF65-F5344CB8AC3E}">
-        <p14:creationId xmlns:p14="http://schemas.microsoft.com/office/powerpoint/2010/main" val="1519797498"/>
-      </p:ext>
-    </p:extLst>
-  </p:cSld>
-  <p:clrMapOvr>
-    <a:masterClrMapping/>
-  </p:clrMapOvr>
-  <p:timing>
-    <p:tnLst>
-      <p:par>
-        <p:cTn id="1" dur="indefinite" restart="never" nodeType="tmRoot"/>
-      </p:par>
-    </p:tnLst>
-  </p:timing>
-</p:sld>
-</file>
-
-<file path=ppt/slides/slide20.xml><?xml version="1.0" encoding="utf-8"?>
+<file path=ppt/slides/slide21.xml><?xml version="1.0" encoding="utf-8"?>
 <p:sld xmlns:a="http://schemas.openxmlformats.org/drawingml/2006/main" xmlns:r="http://schemas.openxmlformats.org/officeDocument/2006/relationships" xmlns:p="http://schemas.openxmlformats.org/presentationml/2006/main">
   <p:cSld>
     <p:spTree>
@@ -5127,7 +5206,7 @@
 </p:sld>
 </file>
 
-<file path=ppt/slides/slide21.xml><?xml version="1.0" encoding="utf-8"?>
+<file path=ppt/slides/slide22.xml><?xml version="1.0" encoding="utf-8"?>
 <p:sld xmlns:a="http://schemas.openxmlformats.org/drawingml/2006/main" xmlns:r="http://schemas.openxmlformats.org/officeDocument/2006/relationships" xmlns:p="http://schemas.openxmlformats.org/presentationml/2006/main">
   <p:cSld>
     <p:spTree>
@@ -5205,7 +5284,7 @@
 </p:sld>
 </file>
 
-<file path=ppt/slides/slide22.xml><?xml version="1.0" encoding="utf-8"?>
+<file path=ppt/slides/slide23.xml><?xml version="1.0" encoding="utf-8"?>
 <p:sld xmlns:a="http://schemas.openxmlformats.org/drawingml/2006/main" xmlns:r="http://schemas.openxmlformats.org/officeDocument/2006/relationships" xmlns:p="http://schemas.openxmlformats.org/presentationml/2006/main">
   <p:cSld>
     <p:spTree>
@@ -5283,7 +5362,7 @@
 </p:sld>
 </file>
 
-<file path=ppt/slides/slide23.xml><?xml version="1.0" encoding="utf-8"?>
+<file path=ppt/slides/slide24.xml><?xml version="1.0" encoding="utf-8"?>
 <p:sld xmlns:a="http://schemas.openxmlformats.org/drawingml/2006/main" xmlns:r="http://schemas.openxmlformats.org/officeDocument/2006/relationships" xmlns:p="http://schemas.openxmlformats.org/presentationml/2006/main">
   <p:cSld>
     <p:spTree>
@@ -5361,7 +5440,7 @@
 </p:sld>
 </file>
 
-<file path=ppt/slides/slide24.xml><?xml version="1.0" encoding="utf-8"?>
+<file path=ppt/slides/slide25.xml><?xml version="1.0" encoding="utf-8"?>
 <p:sld xmlns:a="http://schemas.openxmlformats.org/drawingml/2006/main" xmlns:r="http://schemas.openxmlformats.org/officeDocument/2006/relationships" xmlns:p="http://schemas.openxmlformats.org/presentationml/2006/main">
   <p:cSld>
     <p:spTree>
@@ -5439,7 +5518,7 @@
 </p:sld>
 </file>
 
-<file path=ppt/slides/slide25.xml><?xml version="1.0" encoding="utf-8"?>
+<file path=ppt/slides/slide26.xml><?xml version="1.0" encoding="utf-8"?>
 <p:sld xmlns:a="http://schemas.openxmlformats.org/drawingml/2006/main" xmlns:r="http://schemas.openxmlformats.org/officeDocument/2006/relationships" xmlns:p="http://schemas.openxmlformats.org/presentationml/2006/main">
   <p:cSld>
     <p:spTree>
@@ -5517,7 +5596,7 @@
 </p:sld>
 </file>
 
-<file path=ppt/slides/slide26.xml><?xml version="1.0" encoding="utf-8"?>
+<file path=ppt/slides/slide27.xml><?xml version="1.0" encoding="utf-8"?>
 <p:sld xmlns:a="http://schemas.openxmlformats.org/drawingml/2006/main" xmlns:r="http://schemas.openxmlformats.org/officeDocument/2006/relationships" xmlns:p="http://schemas.openxmlformats.org/presentationml/2006/main">
   <p:cSld>
     <p:spTree>
@@ -5595,7 +5674,7 @@
 </p:sld>
 </file>
 
-<file path=ppt/slides/slide27.xml><?xml version="1.0" encoding="utf-8"?>
+<file path=ppt/slides/slide28.xml><?xml version="1.0" encoding="utf-8"?>
 <p:sld xmlns:a="http://schemas.openxmlformats.org/drawingml/2006/main" xmlns:r="http://schemas.openxmlformats.org/officeDocument/2006/relationships" xmlns:p="http://schemas.openxmlformats.org/presentationml/2006/main">
   <p:cSld>
     <p:spTree>
@@ -5746,7 +5825,7 @@
 </p:sld>
 </file>
 
-<file path=ppt/slides/slide28.xml><?xml version="1.0" encoding="utf-8"?>
+<file path=ppt/slides/slide29.xml><?xml version="1.0" encoding="utf-8"?>
 <p:sld xmlns:a="http://schemas.openxmlformats.org/drawingml/2006/main" xmlns:r="http://schemas.openxmlformats.org/officeDocument/2006/relationships" xmlns:p="http://schemas.openxmlformats.org/presentationml/2006/main">
   <p:cSld>
     <p:spTree>
@@ -5929,7 +6008,100 @@
 </p:sld>
 </file>
 
-<file path=ppt/slides/slide29.xml><?xml version="1.0" encoding="utf-8"?>
+<file path=ppt/slides/slide3.xml><?xml version="1.0" encoding="utf-8"?>
+<p:sld xmlns:a="http://schemas.openxmlformats.org/drawingml/2006/main" xmlns:r="http://schemas.openxmlformats.org/officeDocument/2006/relationships" xmlns:p="http://schemas.openxmlformats.org/presentationml/2006/main">
+  <p:cSld>
+    <p:spTree>
+      <p:nvGrpSpPr>
+        <p:cNvPr id="1" name=""/>
+        <p:cNvGrpSpPr/>
+        <p:nvPr/>
+      </p:nvGrpSpPr>
+      <p:grpSpPr>
+        <a:xfrm>
+          <a:off x="0" y="0"/>
+          <a:ext cx="0" cy="0"/>
+          <a:chOff x="0" y="0"/>
+          <a:chExt cx="0" cy="0"/>
+        </a:xfrm>
+      </p:grpSpPr>
+      <p:sp>
+        <p:nvSpPr>
+          <p:cNvPr id="2" name="TextBox 1"/>
+          <p:cNvSpPr txBox="1"/>
+          <p:nvPr/>
+        </p:nvSpPr>
+        <p:spPr>
+          <a:xfrm>
+            <a:off x="1143000" y="914400"/>
+            <a:ext cx="5016886" cy="1754326"/>
+          </a:xfrm>
+          <a:prstGeom prst="rect">
+            <a:avLst/>
+          </a:prstGeom>
+          <a:noFill/>
+        </p:spPr>
+        <p:txBody>
+          <a:bodyPr wrap="none" rtlCol="0">
+            <a:spAutoFit/>
+          </a:bodyPr>
+          <a:lstStyle/>
+          <a:p>
+            <a:r>
+              <a:rPr lang="en-US" sz="3600" dirty="0" smtClean="0"/>
+              <a:t>Arethusa at </a:t>
+            </a:r>
+            <a:r>
+              <a:rPr lang="en-US" sz="3600" dirty="0" err="1" smtClean="0"/>
+              <a:t>Perseids</a:t>
+            </a:r>
+            <a:endParaRPr lang="en-US" sz="3600" dirty="0" smtClean="0"/>
+          </a:p>
+          <a:p>
+            <a:r>
+              <a:rPr lang="en-US" sz="3600" dirty="0">
+                <a:hlinkClick r:id="rId2"/>
+              </a:rPr>
+              <a:t>http://www.perseids.org</a:t>
+            </a:r>
+            <a:r>
+              <a:rPr lang="en-US" sz="3600" dirty="0" smtClean="0">
+                <a:hlinkClick r:id="rId2"/>
+              </a:rPr>
+              <a:t>/</a:t>
+            </a:r>
+            <a:endParaRPr lang="en-US" sz="3600" dirty="0" smtClean="0"/>
+          </a:p>
+          <a:p>
+            <a:r>
+              <a:rPr lang="en-US" sz="3600" dirty="0" smtClean="0"/>
+              <a:t> </a:t>
+            </a:r>
+            <a:endParaRPr lang="en-US" sz="3600" dirty="0"/>
+          </a:p>
+        </p:txBody>
+      </p:sp>
+    </p:spTree>
+    <p:extLst>
+      <p:ext uri="{BB962C8B-B14F-4D97-AF65-F5344CB8AC3E}">
+        <p14:creationId xmlns:p14="http://schemas.microsoft.com/office/powerpoint/2010/main" val="3972574902"/>
+      </p:ext>
+    </p:extLst>
+  </p:cSld>
+  <p:clrMapOvr>
+    <a:masterClrMapping/>
+  </p:clrMapOvr>
+  <p:timing>
+    <p:tnLst>
+      <p:par>
+        <p:cTn id="1" dur="indefinite" restart="never" nodeType="tmRoot"/>
+      </p:par>
+    </p:tnLst>
+  </p:timing>
+</p:sld>
+</file>
+
+<file path=ppt/slides/slide30.xml><?xml version="1.0" encoding="utf-8"?>
 <p:sld xmlns:a="http://schemas.openxmlformats.org/drawingml/2006/main" xmlns:r="http://schemas.openxmlformats.org/officeDocument/2006/relationships" xmlns:p="http://schemas.openxmlformats.org/presentationml/2006/main">
   <p:cSld>
     <p:spTree>
@@ -6124,100 +6296,7 @@
 </p:sld>
 </file>
 
-<file path=ppt/slides/slide3.xml><?xml version="1.0" encoding="utf-8"?>
-<p:sld xmlns:a="http://schemas.openxmlformats.org/drawingml/2006/main" xmlns:r="http://schemas.openxmlformats.org/officeDocument/2006/relationships" xmlns:p="http://schemas.openxmlformats.org/presentationml/2006/main">
-  <p:cSld>
-    <p:spTree>
-      <p:nvGrpSpPr>
-        <p:cNvPr id="1" name=""/>
-        <p:cNvGrpSpPr/>
-        <p:nvPr/>
-      </p:nvGrpSpPr>
-      <p:grpSpPr>
-        <a:xfrm>
-          <a:off x="0" y="0"/>
-          <a:ext cx="0" cy="0"/>
-          <a:chOff x="0" y="0"/>
-          <a:chExt cx="0" cy="0"/>
-        </a:xfrm>
-      </p:grpSpPr>
-      <p:sp>
-        <p:nvSpPr>
-          <p:cNvPr id="2" name="TextBox 1"/>
-          <p:cNvSpPr txBox="1"/>
-          <p:nvPr/>
-        </p:nvSpPr>
-        <p:spPr>
-          <a:xfrm>
-            <a:off x="1143000" y="914400"/>
-            <a:ext cx="5016886" cy="1754326"/>
-          </a:xfrm>
-          <a:prstGeom prst="rect">
-            <a:avLst/>
-          </a:prstGeom>
-          <a:noFill/>
-        </p:spPr>
-        <p:txBody>
-          <a:bodyPr wrap="none" rtlCol="0">
-            <a:spAutoFit/>
-          </a:bodyPr>
-          <a:lstStyle/>
-          <a:p>
-            <a:r>
-              <a:rPr lang="en-US" sz="3600" dirty="0" smtClean="0"/>
-              <a:t>Arethusa at </a:t>
-            </a:r>
-            <a:r>
-              <a:rPr lang="en-US" sz="3600" dirty="0" err="1" smtClean="0"/>
-              <a:t>Perseids</a:t>
-            </a:r>
-            <a:endParaRPr lang="en-US" sz="3600" dirty="0" smtClean="0"/>
-          </a:p>
-          <a:p>
-            <a:r>
-              <a:rPr lang="en-US" sz="3600" dirty="0">
-                <a:hlinkClick r:id="rId2"/>
-              </a:rPr>
-              <a:t>http://www.perseids.org</a:t>
-            </a:r>
-            <a:r>
-              <a:rPr lang="en-US" sz="3600" dirty="0" smtClean="0">
-                <a:hlinkClick r:id="rId2"/>
-              </a:rPr>
-              <a:t>/</a:t>
-            </a:r>
-            <a:endParaRPr lang="en-US" sz="3600" dirty="0" smtClean="0"/>
-          </a:p>
-          <a:p>
-            <a:r>
-              <a:rPr lang="en-US" sz="3600" dirty="0" smtClean="0"/>
-              <a:t> </a:t>
-            </a:r>
-            <a:endParaRPr lang="en-US" sz="3600" dirty="0"/>
-          </a:p>
-        </p:txBody>
-      </p:sp>
-    </p:spTree>
-    <p:extLst>
-      <p:ext uri="{BB962C8B-B14F-4D97-AF65-F5344CB8AC3E}">
-        <p14:creationId xmlns:p14="http://schemas.microsoft.com/office/powerpoint/2010/main" val="3972574902"/>
-      </p:ext>
-    </p:extLst>
-  </p:cSld>
-  <p:clrMapOvr>
-    <a:masterClrMapping/>
-  </p:clrMapOvr>
-  <p:timing>
-    <p:tnLst>
-      <p:par>
-        <p:cTn id="1" dur="indefinite" restart="never" nodeType="tmRoot"/>
-      </p:par>
-    </p:tnLst>
-  </p:timing>
-</p:sld>
-</file>
-
-<file path=ppt/slides/slide30.xml><?xml version="1.0" encoding="utf-8"?>
+<file path=ppt/slides/slide31.xml><?xml version="1.0" encoding="utf-8"?>
 <p:sld xmlns:a="http://schemas.openxmlformats.org/drawingml/2006/main" xmlns:r="http://schemas.openxmlformats.org/officeDocument/2006/relationships" xmlns:p="http://schemas.openxmlformats.org/presentationml/2006/main">
   <p:cSld>
     <p:spTree>
@@ -6416,7 +6495,7 @@
 </p:sld>
 </file>
 
-<file path=ppt/slides/slide31.xml><?xml version="1.0" encoding="utf-8"?>
+<file path=ppt/slides/slide32.xml><?xml version="1.0" encoding="utf-8"?>
 <p:sld xmlns:a="http://schemas.openxmlformats.org/drawingml/2006/main" xmlns:r="http://schemas.openxmlformats.org/officeDocument/2006/relationships" xmlns:p="http://schemas.openxmlformats.org/presentationml/2006/main">
   <p:cSld>
     <p:spTree>
@@ -6650,7 +6729,7 @@
 </p:sld>
 </file>
 
-<file path=ppt/slides/slide32.xml><?xml version="1.0" encoding="utf-8"?>
+<file path=ppt/slides/slide33.xml><?xml version="1.0" encoding="utf-8"?>
 <p:sld xmlns:a="http://schemas.openxmlformats.org/drawingml/2006/main" xmlns:r="http://schemas.openxmlformats.org/officeDocument/2006/relationships" xmlns:p="http://schemas.openxmlformats.org/presentationml/2006/main">
   <p:cSld>
     <p:spTree>
@@ -6857,7 +6936,7 @@
 </p:sld>
 </file>
 
-<file path=ppt/slides/slide33.xml><?xml version="1.0" encoding="utf-8"?>
+<file path=ppt/slides/slide34.xml><?xml version="1.0" encoding="utf-8"?>
 <p:sld xmlns:a="http://schemas.openxmlformats.org/drawingml/2006/main" xmlns:r="http://schemas.openxmlformats.org/officeDocument/2006/relationships" xmlns:p="http://schemas.openxmlformats.org/presentationml/2006/main">
   <p:cSld>
     <p:spTree>
@@ -6911,110 +6990,51 @@
           <a:chExt cx="0" cy="0"/>
         </a:xfrm>
       </p:grpSpPr>
-      <p:sp>
-        <p:nvSpPr>
-          <p:cNvPr id="2" name="TextBox 1"/>
-          <p:cNvSpPr txBox="1"/>
+      <p:pic>
+        <p:nvPicPr>
+          <p:cNvPr id="1026" name="Picture 2" descr="C:\Users\bgorman\AppData\Local\Skitch\Screenshot_112115_091624_AM.jpg"/>
+          <p:cNvPicPr>
+            <a:picLocks noChangeAspect="1" noChangeArrowheads="1"/>
+          </p:cNvPicPr>
           <p:nvPr/>
-        </p:nvSpPr>
-        <p:spPr>
+        </p:nvPicPr>
+        <p:blipFill>
+          <a:blip r:embed="rId2">
+            <a:extLst>
+              <a:ext uri="{28A0092B-C50C-407E-A947-70E740481C1C}">
+                <a14:useLocalDpi xmlns:a14="http://schemas.microsoft.com/office/drawing/2010/main" val="0"/>
+              </a:ext>
+            </a:extLst>
+          </a:blip>
+          <a:srcRect/>
+          <a:stretch>
+            <a:fillRect/>
+          </a:stretch>
+        </p:blipFill>
+        <p:spPr bwMode="auto">
           <a:xfrm>
-            <a:off x="381001" y="1600200"/>
-            <a:ext cx="8153400" cy="1754326"/>
+            <a:off x="185610" y="685800"/>
+            <a:ext cx="8944535" cy="4953000"/>
           </a:xfrm>
           <a:prstGeom prst="rect">
             <a:avLst/>
           </a:prstGeom>
           <a:noFill/>
-        </p:spPr>
-        <p:txBody>
-          <a:bodyPr wrap="square" rtlCol="0">
-            <a:spAutoFit/>
-          </a:bodyPr>
-          <a:lstStyle/>
-          <a:p>
-            <a:r>
-              <a:rPr lang="en-US" dirty="0" smtClean="0"/>
-              <a:t>After</a:t>
-            </a:r>
-          </a:p>
-          <a:p>
-            <a:pPr marL="285750" indent="-285750">
-              <a:buFont typeface="Arial" panose="020B0604020202020204" pitchFamily="34" charset="0"/>
-              <a:buChar char="•"/>
-            </a:pPr>
-            <a:r>
-              <a:rPr lang="en-US" dirty="0" smtClean="0"/>
-              <a:t>Charles Hollingsworth, “Using Dependency-Based Annotations for Authorship Identification” (2012), introduces “</a:t>
-            </a:r>
-            <a:r>
-              <a:rPr lang="en-US" dirty="0" err="1" smtClean="0"/>
-              <a:t>DepWords</a:t>
-            </a:r>
-            <a:r>
-              <a:rPr lang="en-US" dirty="0" smtClean="0"/>
-              <a:t>”</a:t>
-            </a:r>
-            <a:br>
-              <a:rPr lang="en-US" dirty="0" smtClean="0"/>
-            </a:br>
-            <a:endParaRPr lang="en-US" dirty="0" smtClean="0"/>
-          </a:p>
-          <a:p>
-            <a:pPr marL="285750" indent="-285750">
-              <a:buFont typeface="Arial" panose="020B0604020202020204" pitchFamily="34" charset="0"/>
-              <a:buChar char="•"/>
-            </a:pPr>
-            <a:r>
-              <a:rPr lang="en-US" dirty="0" smtClean="0"/>
-              <a:t>Grigori </a:t>
-            </a:r>
-            <a:r>
-              <a:rPr lang="en-US" dirty="0" err="1" smtClean="0"/>
-              <a:t>Sidorov</a:t>
-            </a:r>
-            <a:r>
-              <a:rPr lang="en-US" dirty="0" smtClean="0"/>
-              <a:t>, “Syntactic Dependency-Based N-grams as Classification Features” (2012),  introduces “Sn-grams” (“syntactic n-grams)</a:t>
-            </a:r>
-            <a:endParaRPr lang="en-US" dirty="0"/>
-          </a:p>
-        </p:txBody>
-      </p:sp>
-      <p:sp>
-        <p:nvSpPr>
-          <p:cNvPr id="3" name="TextBox 2"/>
-          <p:cNvSpPr txBox="1"/>
-          <p:nvPr/>
-        </p:nvSpPr>
-        <p:spPr>
-          <a:xfrm>
-            <a:off x="2819400" y="396017"/>
-            <a:ext cx="2785955" cy="584775"/>
-          </a:xfrm>
-          <a:prstGeom prst="rect">
-            <a:avLst/>
-          </a:prstGeom>
-          <a:noFill/>
-        </p:spPr>
-        <p:txBody>
-          <a:bodyPr wrap="none" rtlCol="0">
-            <a:spAutoFit/>
-          </a:bodyPr>
-          <a:lstStyle/>
-          <a:p>
-            <a:r>
-              <a:rPr lang="en-US" sz="3200" dirty="0" smtClean="0"/>
-              <a:t>“Syntax Words”</a:t>
-            </a:r>
-            <a:endParaRPr lang="en-US" sz="3200" dirty="0"/>
-          </a:p>
-        </p:txBody>
-      </p:sp>
+          <a:extLst>
+            <a:ext uri="{909E8E84-426E-40DD-AFC4-6F175D3DCCD1}">
+              <a14:hiddenFill xmlns:a14="http://schemas.microsoft.com/office/drawing/2010/main">
+                <a:solidFill>
+                  <a:srgbClr val="FFFFFF"/>
+                </a:solidFill>
+              </a14:hiddenFill>
+            </a:ext>
+          </a:extLst>
+        </p:spPr>
+      </p:pic>
     </p:spTree>
     <p:extLst>
       <p:ext uri="{BB962C8B-B14F-4D97-AF65-F5344CB8AC3E}">
-        <p14:creationId xmlns:p14="http://schemas.microsoft.com/office/powerpoint/2010/main" val="3976027406"/>
+        <p14:creationId xmlns:p14="http://schemas.microsoft.com/office/powerpoint/2010/main" val="3823143963"/>
       </p:ext>
     </p:extLst>
   </p:cSld>
@@ -7048,10 +7068,110 @@
           <a:chExt cx="0" cy="0"/>
         </a:xfrm>
       </p:grpSpPr>
+      <p:sp>
+        <p:nvSpPr>
+          <p:cNvPr id="2" name="TextBox 1"/>
+          <p:cNvSpPr txBox="1"/>
+          <p:nvPr/>
+        </p:nvSpPr>
+        <p:spPr>
+          <a:xfrm>
+            <a:off x="381001" y="1600200"/>
+            <a:ext cx="8153400" cy="1754326"/>
+          </a:xfrm>
+          <a:prstGeom prst="rect">
+            <a:avLst/>
+          </a:prstGeom>
+          <a:noFill/>
+        </p:spPr>
+        <p:txBody>
+          <a:bodyPr wrap="square" rtlCol="0">
+            <a:spAutoFit/>
+          </a:bodyPr>
+          <a:lstStyle/>
+          <a:p>
+            <a:r>
+              <a:rPr lang="en-US" dirty="0" smtClean="0"/>
+              <a:t>After</a:t>
+            </a:r>
+          </a:p>
+          <a:p>
+            <a:pPr marL="285750" indent="-285750">
+              <a:buFont typeface="Arial" panose="020B0604020202020204" pitchFamily="34" charset="0"/>
+              <a:buChar char="•"/>
+            </a:pPr>
+            <a:r>
+              <a:rPr lang="en-US" dirty="0" smtClean="0"/>
+              <a:t>Charles Hollingsworth, “Using Dependency-Based Annotations for Authorship Identification” (2012), introduces “</a:t>
+            </a:r>
+            <a:r>
+              <a:rPr lang="en-US" dirty="0" err="1" smtClean="0"/>
+              <a:t>DepWords</a:t>
+            </a:r>
+            <a:r>
+              <a:rPr lang="en-US" dirty="0" smtClean="0"/>
+              <a:t>”</a:t>
+            </a:r>
+            <a:br>
+              <a:rPr lang="en-US" dirty="0" smtClean="0"/>
+            </a:br>
+            <a:endParaRPr lang="en-US" dirty="0" smtClean="0"/>
+          </a:p>
+          <a:p>
+            <a:pPr marL="285750" indent="-285750">
+              <a:buFont typeface="Arial" panose="020B0604020202020204" pitchFamily="34" charset="0"/>
+              <a:buChar char="•"/>
+            </a:pPr>
+            <a:r>
+              <a:rPr lang="en-US" dirty="0" smtClean="0"/>
+              <a:t>Grigori </a:t>
+            </a:r>
+            <a:r>
+              <a:rPr lang="en-US" dirty="0" err="1" smtClean="0"/>
+              <a:t>Sidorov</a:t>
+            </a:r>
+            <a:r>
+              <a:rPr lang="en-US" dirty="0" smtClean="0"/>
+              <a:t>, “Syntactic Dependency-Based N-grams as Classification Features” (2012),  introduces “Sn-grams” (“syntactic n-grams)</a:t>
+            </a:r>
+            <a:endParaRPr lang="en-US" dirty="0"/>
+          </a:p>
+        </p:txBody>
+      </p:sp>
+      <p:sp>
+        <p:nvSpPr>
+          <p:cNvPr id="3" name="TextBox 2"/>
+          <p:cNvSpPr txBox="1"/>
+          <p:nvPr/>
+        </p:nvSpPr>
+        <p:spPr>
+          <a:xfrm>
+            <a:off x="2819400" y="396017"/>
+            <a:ext cx="2785955" cy="584775"/>
+          </a:xfrm>
+          <a:prstGeom prst="rect">
+            <a:avLst/>
+          </a:prstGeom>
+          <a:noFill/>
+        </p:spPr>
+        <p:txBody>
+          <a:bodyPr wrap="none" rtlCol="0">
+            <a:spAutoFit/>
+          </a:bodyPr>
+          <a:lstStyle/>
+          <a:p>
+            <a:r>
+              <a:rPr lang="en-US" sz="3200" dirty="0" smtClean="0"/>
+              <a:t>“Syntax Words”</a:t>
+            </a:r>
+            <a:endParaRPr lang="en-US" sz="3200" dirty="0"/>
+          </a:p>
+        </p:txBody>
+      </p:sp>
     </p:spTree>
     <p:extLst>
       <p:ext uri="{BB962C8B-B14F-4D97-AF65-F5344CB8AC3E}">
-        <p14:creationId xmlns:p14="http://schemas.microsoft.com/office/powerpoint/2010/main" val="953151465"/>
+        <p14:creationId xmlns:p14="http://schemas.microsoft.com/office/powerpoint/2010/main" val="3976027406"/>
       </p:ext>
     </p:extLst>
   </p:cSld>
@@ -7069,6 +7189,135 @@
 </file>
 
 <file path=ppt/slides/slide6.xml><?xml version="1.0" encoding="utf-8"?>
+<p:sld xmlns:a="http://schemas.openxmlformats.org/drawingml/2006/main" xmlns:r="http://schemas.openxmlformats.org/officeDocument/2006/relationships" xmlns:p="http://schemas.openxmlformats.org/presentationml/2006/main">
+  <p:cSld>
+    <p:spTree>
+      <p:nvGrpSpPr>
+        <p:cNvPr id="1" name=""/>
+        <p:cNvGrpSpPr/>
+        <p:nvPr/>
+      </p:nvGrpSpPr>
+      <p:grpSpPr>
+        <a:xfrm>
+          <a:off x="0" y="0"/>
+          <a:ext cx="0" cy="0"/>
+          <a:chOff x="0" y="0"/>
+          <a:chExt cx="0" cy="0"/>
+        </a:xfrm>
+      </p:grpSpPr>
+      <p:sp>
+        <p:nvSpPr>
+          <p:cNvPr id="2" name="Rectangle 1"/>
+          <p:cNvSpPr/>
+          <p:nvPr/>
+        </p:nvSpPr>
+        <p:spPr>
+          <a:xfrm>
+            <a:off x="152400" y="762000"/>
+            <a:ext cx="8839200" cy="3046988"/>
+          </a:xfrm>
+          <a:prstGeom prst="rect">
+            <a:avLst/>
+          </a:prstGeom>
+        </p:spPr>
+        <p:txBody>
+          <a:bodyPr wrap="square">
+            <a:spAutoFit/>
+          </a:bodyPr>
+          <a:lstStyle/>
+          <a:p>
+            <a:r>
+              <a:rPr lang="en-US" sz="3200" dirty="0"/>
+              <a:t>&lt;word id="4" form="</a:t>
+            </a:r>
+            <a:r>
+              <a:rPr lang="el-GR" sz="3200" dirty="0"/>
+              <a:t>ὄχλος" </a:t>
+            </a:r>
+            <a:r>
+              <a:rPr lang="en-US" sz="3200" dirty="0"/>
+              <a:t>lemma="</a:t>
+            </a:r>
+            <a:r>
+              <a:rPr lang="el-GR" sz="3200" dirty="0"/>
+              <a:t>ὄχλος" </a:t>
+            </a:r>
+            <a:r>
+              <a:rPr lang="en-US" sz="3200" dirty="0" err="1"/>
+              <a:t>postag</a:t>
+            </a:r>
+            <a:r>
+              <a:rPr lang="en-US" sz="3200" dirty="0"/>
+              <a:t>="n-s---</a:t>
+            </a:r>
+            <a:r>
+              <a:rPr lang="en-US" sz="3200" dirty="0" err="1"/>
+              <a:t>mn</a:t>
+            </a:r>
+            <a:r>
+              <a:rPr lang="en-US" sz="3200" dirty="0"/>
+              <a:t>-" relation="SBJ" head="5</a:t>
+            </a:r>
+            <a:r>
+              <a:rPr lang="en-US" sz="3200" dirty="0" smtClean="0"/>
+              <a:t>"/&gt;</a:t>
+            </a:r>
+          </a:p>
+          <a:p>
+            <a:endParaRPr lang="en-US" sz="3200" dirty="0"/>
+          </a:p>
+          <a:p>
+            <a:endParaRPr lang="en-US" sz="3200" dirty="0"/>
+          </a:p>
+          <a:p>
+            <a:r>
+              <a:rPr lang="en-US" sz="3200" dirty="0"/>
+              <a:t>      &lt;word id="5" form="</a:t>
+            </a:r>
+            <a:r>
+              <a:rPr lang="el-GR" sz="3200" dirty="0"/>
+              <a:t>ἐζήτουν" </a:t>
+            </a:r>
+            <a:r>
+              <a:rPr lang="en-US" sz="3200" dirty="0"/>
+              <a:t>lemma="</a:t>
+            </a:r>
+            <a:r>
+              <a:rPr lang="el-GR" sz="3200" dirty="0"/>
+              <a:t>ζητέω" </a:t>
+            </a:r>
+            <a:r>
+              <a:rPr lang="en-US" sz="3200" dirty="0" err="1"/>
+              <a:t>postag</a:t>
+            </a:r>
+            <a:r>
+              <a:rPr lang="en-US" sz="3200" dirty="0"/>
+              <a:t>="v3piia---" relation="PRED" head="0"/&gt;</a:t>
+            </a:r>
+          </a:p>
+        </p:txBody>
+      </p:sp>
+    </p:spTree>
+    <p:extLst>
+      <p:ext uri="{BB962C8B-B14F-4D97-AF65-F5344CB8AC3E}">
+        <p14:creationId xmlns:p14="http://schemas.microsoft.com/office/powerpoint/2010/main" val="1827705205"/>
+      </p:ext>
+    </p:extLst>
+  </p:cSld>
+  <p:clrMapOvr>
+    <a:masterClrMapping/>
+  </p:clrMapOvr>
+  <p:timing>
+    <p:tnLst>
+      <p:par>
+        <p:cTn id="1" dur="indefinite" restart="never" nodeType="tmRoot"/>
+      </p:par>
+    </p:tnLst>
+  </p:timing>
+</p:sld>
+</file>
+
+<file path=ppt/slides/slide7.xml><?xml version="1.0" encoding="utf-8"?>
 <p:sld xmlns:a="http://schemas.openxmlformats.org/drawingml/2006/main" xmlns:r="http://schemas.openxmlformats.org/officeDocument/2006/relationships" xmlns:p="http://schemas.openxmlformats.org/presentationml/2006/main">
   <p:cSld>
     <p:spTree>
@@ -7199,7 +7448,7 @@
 </p:sld>
 </file>
 
-<file path=ppt/slides/slide7.xml><?xml version="1.0" encoding="utf-8"?>
+<file path=ppt/slides/slide8.xml><?xml version="1.0" encoding="utf-8"?>
 <p:sld xmlns:a="http://schemas.openxmlformats.org/drawingml/2006/main" xmlns:r="http://schemas.openxmlformats.org/officeDocument/2006/relationships" xmlns:p="http://schemas.openxmlformats.org/presentationml/2006/main">
   <p:cSld>
     <p:spTree>
@@ -7277,7 +7526,7 @@
 </p:sld>
 </file>
 
-<file path=ppt/slides/slide8.xml><?xml version="1.0" encoding="utf-8"?>
+<file path=ppt/slides/slide9.xml><?xml version="1.0" encoding="utf-8"?>
 <p:sld xmlns:a="http://schemas.openxmlformats.org/drawingml/2006/main" xmlns:r="http://schemas.openxmlformats.org/officeDocument/2006/relationships" xmlns:p="http://schemas.openxmlformats.org/presentationml/2006/main">
   <p:cSld>
     <p:spTree>
@@ -7380,84 +7629,6 @@
     <p:extLst>
       <p:ext uri="{BB962C8B-B14F-4D97-AF65-F5344CB8AC3E}">
         <p14:creationId xmlns:p14="http://schemas.microsoft.com/office/powerpoint/2010/main" val="953151465"/>
-      </p:ext>
-    </p:extLst>
-  </p:cSld>
-  <p:clrMapOvr>
-    <a:masterClrMapping/>
-  </p:clrMapOvr>
-  <p:timing>
-    <p:tnLst>
-      <p:par>
-        <p:cTn id="1" dur="indefinite" restart="never" nodeType="tmRoot"/>
-      </p:par>
-    </p:tnLst>
-  </p:timing>
-</p:sld>
-</file>
-
-<file path=ppt/slides/slide9.xml><?xml version="1.0" encoding="utf-8"?>
-<p:sld xmlns:a="http://schemas.openxmlformats.org/drawingml/2006/main" xmlns:r="http://schemas.openxmlformats.org/officeDocument/2006/relationships" xmlns:p="http://schemas.openxmlformats.org/presentationml/2006/main">
-  <p:cSld>
-    <p:spTree>
-      <p:nvGrpSpPr>
-        <p:cNvPr id="1" name=""/>
-        <p:cNvGrpSpPr/>
-        <p:nvPr/>
-      </p:nvGrpSpPr>
-      <p:grpSpPr>
-        <a:xfrm>
-          <a:off x="0" y="0"/>
-          <a:ext cx="0" cy="0"/>
-          <a:chOff x="0" y="0"/>
-          <a:chExt cx="0" cy="0"/>
-        </a:xfrm>
-      </p:grpSpPr>
-      <p:pic>
-        <p:nvPicPr>
-          <p:cNvPr id="2" name="Picture 1" descr="C:\Users\Bob Gorman\AppData\Local\Skitch\Screenshot_111315_060830_PM.jpg"/>
-          <p:cNvPicPr>
-            <a:picLocks noChangeAspect="1" noChangeArrowheads="1"/>
-          </p:cNvPicPr>
-          <p:nvPr/>
-        </p:nvPicPr>
-        <p:blipFill>
-          <a:blip r:embed="rId2">
-            <a:extLst>
-              <a:ext uri="{28A0092B-C50C-407E-A947-70E740481C1C}">
-                <a14:useLocalDpi xmlns:a14="http://schemas.microsoft.com/office/drawing/2010/main" val="0"/>
-              </a:ext>
-            </a:extLst>
-          </a:blip>
-          <a:srcRect/>
-          <a:stretch>
-            <a:fillRect/>
-          </a:stretch>
-        </p:blipFill>
-        <p:spPr bwMode="auto">
-          <a:xfrm>
-            <a:off x="457200" y="1524000"/>
-            <a:ext cx="8382000" cy="896565"/>
-          </a:xfrm>
-          <a:prstGeom prst="rect">
-            <a:avLst/>
-          </a:prstGeom>
-          <a:noFill/>
-          <a:extLst>
-            <a:ext uri="{909E8E84-426E-40DD-AFC4-6F175D3DCCD1}">
-              <a14:hiddenFill xmlns:a14="http://schemas.microsoft.com/office/drawing/2010/main">
-                <a:solidFill>
-                  <a:srgbClr val="FFFFFF"/>
-                </a:solidFill>
-              </a14:hiddenFill>
-            </a:ext>
-          </a:extLst>
-        </p:spPr>
-      </p:pic>
-    </p:spTree>
-    <p:extLst>
-      <p:ext uri="{BB962C8B-B14F-4D97-AF65-F5344CB8AC3E}">
-        <p14:creationId xmlns:p14="http://schemas.microsoft.com/office/powerpoint/2010/main" val="437755951"/>
       </p:ext>
     </p:extLst>
   </p:cSld>

</xml_diff>